<commit_message>
Add initial version of Cars price presentation file
</commit_message>
<xml_diff>
--- a/Cars price.pptx
+++ b/Cars price.pptx
@@ -279,7 +279,7 @@
           <a:p>
             <a:fld id="{1C8322F6-1C60-46CF-968C-BC20E470F443}" type="datetimeFigureOut">
               <a:rPr lang="en-US" smtClean="0"/>
-              <a:t>4/30/2025</a:t>
+              <a:t>5/1/2025</a:t>
             </a:fld>
             <a:endParaRPr lang="en-US"/>
           </a:p>
@@ -613,7 +613,7 @@
           <a:p>
             <a:fld id="{1C8322F6-1C60-46CF-968C-BC20E470F443}" type="datetimeFigureOut">
               <a:rPr lang="en-US" smtClean="0"/>
-              <a:t>4/30/2025</a:t>
+              <a:t>5/1/2025</a:t>
             </a:fld>
             <a:endParaRPr lang="en-US"/>
           </a:p>
@@ -866,7 +866,7 @@
           <a:p>
             <a:fld id="{1C8322F6-1C60-46CF-968C-BC20E470F443}" type="datetimeFigureOut">
               <a:rPr lang="en-US" smtClean="0"/>
-              <a:t>4/30/2025</a:t>
+              <a:t>5/1/2025</a:t>
             </a:fld>
             <a:endParaRPr lang="en-US"/>
           </a:p>
@@ -1200,7 +1200,7 @@
           <a:p>
             <a:fld id="{1C8322F6-1C60-46CF-968C-BC20E470F443}" type="datetimeFigureOut">
               <a:rPr lang="en-US" smtClean="0"/>
-              <a:t>4/30/2025</a:t>
+              <a:t>5/1/2025</a:t>
             </a:fld>
             <a:endParaRPr lang="en-US"/>
           </a:p>
@@ -1481,7 +1481,7 @@
           <a:p>
             <a:fld id="{1C8322F6-1C60-46CF-968C-BC20E470F443}" type="datetimeFigureOut">
               <a:rPr lang="en-US" smtClean="0"/>
-              <a:t>4/30/2025</a:t>
+              <a:t>5/1/2025</a:t>
             </a:fld>
             <a:endParaRPr lang="en-US"/>
           </a:p>
@@ -1883,7 +1883,7 @@
           <a:p>
             <a:fld id="{1C8322F6-1C60-46CF-968C-BC20E470F443}" type="datetimeFigureOut">
               <a:rPr lang="en-US" smtClean="0"/>
-              <a:t>4/30/2025</a:t>
+              <a:t>5/1/2025</a:t>
             </a:fld>
             <a:endParaRPr lang="en-US"/>
           </a:p>
@@ -2344,7 +2344,7 @@
           <a:p>
             <a:fld id="{1C8322F6-1C60-46CF-968C-BC20E470F443}" type="datetimeFigureOut">
               <a:rPr lang="en-US" smtClean="0"/>
-              <a:t>4/30/2025</a:t>
+              <a:t>5/1/2025</a:t>
             </a:fld>
             <a:endParaRPr lang="en-US"/>
           </a:p>
@@ -2577,7 +2577,7 @@
           <a:p>
             <a:fld id="{1C8322F6-1C60-46CF-968C-BC20E470F443}" type="datetimeFigureOut">
               <a:rPr lang="en-US" smtClean="0"/>
-              <a:t>4/30/2025</a:t>
+              <a:t>5/1/2025</a:t>
             </a:fld>
             <a:endParaRPr lang="en-US"/>
           </a:p>
@@ -2776,7 +2776,7 @@
           <a:p>
             <a:fld id="{1C8322F6-1C60-46CF-968C-BC20E470F443}" type="datetimeFigureOut">
               <a:rPr lang="en-US" smtClean="0"/>
-              <a:t>4/30/2025</a:t>
+              <a:t>5/1/2025</a:t>
             </a:fld>
             <a:endParaRPr lang="en-US"/>
           </a:p>
@@ -3089,7 +3089,7 @@
           <a:p>
             <a:fld id="{1C8322F6-1C60-46CF-968C-BC20E470F443}" type="datetimeFigureOut">
               <a:rPr lang="en-US" smtClean="0"/>
-              <a:t>4/30/2025</a:t>
+              <a:t>5/1/2025</a:t>
             </a:fld>
             <a:endParaRPr lang="en-US"/>
           </a:p>
@@ -3553,7 +3553,7 @@
           <a:p>
             <a:fld id="{1C8322F6-1C60-46CF-968C-BC20E470F443}" type="datetimeFigureOut">
               <a:rPr lang="en-US" smtClean="0"/>
-              <a:t>4/30/2025</a:t>
+              <a:t>5/1/2025</a:t>
             </a:fld>
             <a:endParaRPr lang="en-US"/>
           </a:p>
@@ -3966,7 +3966,7 @@
           <a:p>
             <a:fld id="{1C8322F6-1C60-46CF-968C-BC20E470F443}" type="datetimeFigureOut">
               <a:rPr lang="en-US" smtClean="0"/>
-              <a:t>4/30/2025</a:t>
+              <a:t>5/1/2025</a:t>
             </a:fld>
             <a:endParaRPr lang="en-US"/>
           </a:p>
@@ -9369,8 +9369,8 @@
         </p:blipFill>
         <p:spPr>
           <a:xfrm>
-            <a:off x="6905284" y="1821792"/>
-            <a:ext cx="4714892" cy="3206126"/>
+            <a:off x="6905283" y="668593"/>
+            <a:ext cx="5129399" cy="5388076"/>
           </a:xfrm>
           <a:prstGeom prst="rect">
             <a:avLst/>
@@ -9963,7 +9963,7 @@
       </p:grpSpPr>
       <p:cxnSp>
         <p:nvCxnSpPr>
-          <p:cNvPr id="10" name="Straight Connector 9">
+          <p:cNvPr id="27" name="Straight Connector 26">
             <a:extLst>
               <a:ext uri="{FF2B5EF4-FFF2-40B4-BE49-F238E27FC236}">
                 <a16:creationId xmlns:a16="http://schemas.microsoft.com/office/drawing/2014/main" id="{A240FCEE-B6E2-46D0-9BB0-F45F79545E9D}"/>
@@ -10015,7 +10015,7 @@
       </p:cxnSp>
       <p:cxnSp>
         <p:nvCxnSpPr>
-          <p:cNvPr id="12" name="Straight Connector 11">
+          <p:cNvPr id="29" name="Straight Connector 28">
             <a:extLst>
               <a:ext uri="{FF2B5EF4-FFF2-40B4-BE49-F238E27FC236}">
                 <a16:creationId xmlns:a16="http://schemas.microsoft.com/office/drawing/2014/main" id="{3BD2FB83-3783-4477-80B5-DA5BF10BAF57}"/>
@@ -10067,7 +10067,7 @@
       </p:cxnSp>
       <p:cxnSp>
         <p:nvCxnSpPr>
-          <p:cNvPr id="14" name="Straight Connector 13">
+          <p:cNvPr id="31" name="Straight Connector 30">
             <a:extLst>
               <a:ext uri="{FF2B5EF4-FFF2-40B4-BE49-F238E27FC236}">
                 <a16:creationId xmlns:a16="http://schemas.microsoft.com/office/drawing/2014/main" id="{E83EA203-71D5-49C0-9626-FFA8E46787B0}"/>
@@ -10119,7 +10119,7 @@
       </p:cxnSp>
       <p:sp useBgFill="1">
         <p:nvSpPr>
-          <p:cNvPr id="16" name="Rectangle 15">
+          <p:cNvPr id="33" name="Rectangle 32">
             <a:extLst>
               <a:ext uri="{FF2B5EF4-FFF2-40B4-BE49-F238E27FC236}">
                 <a16:creationId xmlns:a16="http://schemas.microsoft.com/office/drawing/2014/main" id="{D26BC87E-DCC8-4E66-972D-A587756DF30A}"/>
@@ -10225,7 +10225,7 @@
       </p:sp>
       <p:cxnSp>
         <p:nvCxnSpPr>
-          <p:cNvPr id="18" name="Straight Connector 17">
+          <p:cNvPr id="35" name="Straight Connector 34">
             <a:extLst>
               <a:ext uri="{FF2B5EF4-FFF2-40B4-BE49-F238E27FC236}">
                 <a16:creationId xmlns:a16="http://schemas.microsoft.com/office/drawing/2014/main" id="{8B45C962-0D68-4A01-9627-70DEBBC363C7}"/>
@@ -10277,7 +10277,7 @@
       </p:cxnSp>
       <p:cxnSp>
         <p:nvCxnSpPr>
-          <p:cNvPr id="20" name="Straight Connector 19">
+          <p:cNvPr id="37" name="Straight Connector 36">
             <a:extLst>
               <a:ext uri="{FF2B5EF4-FFF2-40B4-BE49-F238E27FC236}">
                 <a16:creationId xmlns:a16="http://schemas.microsoft.com/office/drawing/2014/main" id="{F1D89FBF-493B-4E7D-B511-7E40674F6323}"/>
@@ -10329,10 +10329,10 @@
       </p:cxnSp>
       <p:pic>
         <p:nvPicPr>
-          <p:cNvPr id="5" name="Content Placeholder 4" descr="A screen shot of a graph&#10;&#10;AI-generated content may be incorrect.">
-            <a:extLst>
-              <a:ext uri="{FF2B5EF4-FFF2-40B4-BE49-F238E27FC236}">
-                <a16:creationId xmlns:a16="http://schemas.microsoft.com/office/drawing/2014/main" id="{1111665E-5AD7-5480-1BF5-2B71099509C8}"/>
+          <p:cNvPr id="7" name="Content Placeholder 6">
+            <a:extLst>
+              <a:ext uri="{FF2B5EF4-FFF2-40B4-BE49-F238E27FC236}">
+                <a16:creationId xmlns:a16="http://schemas.microsoft.com/office/drawing/2014/main" id="{CB9DB76F-76E5-D455-AE38-BB2FB827A30E}"/>
               </a:ext>
             </a:extLst>
           </p:cNvPr>
@@ -10344,21 +10344,15 @@
           </p:nvPr>
         </p:nvPicPr>
         <p:blipFill>
-          <a:blip r:embed="rId2">
-            <a:extLst>
-              <a:ext uri="{28A0092B-C50C-407E-A947-70E740481C1C}">
-                <a14:useLocalDpi xmlns:a14="http://schemas.microsoft.com/office/drawing/2010/main" val="0"/>
-              </a:ext>
-            </a:extLst>
-          </a:blip>
+          <a:blip r:embed="rId2"/>
           <a:stretch>
             <a:fillRect/>
           </a:stretch>
         </p:blipFill>
         <p:spPr>
           <a:xfrm>
-            <a:off x="5800384" y="1036646"/>
-            <a:ext cx="5820112" cy="4001327"/>
+            <a:off x="5800383" y="930404"/>
+            <a:ext cx="6168095" cy="4788792"/>
           </a:xfrm>
           <a:prstGeom prst="rect">
             <a:avLst/>
@@ -10367,7 +10361,7 @@
       </p:pic>
       <p:cxnSp>
         <p:nvCxnSpPr>
-          <p:cNvPr id="22" name="Straight Connector 21">
+          <p:cNvPr id="39" name="Straight Connector 38">
             <a:extLst>
               <a:ext uri="{FF2B5EF4-FFF2-40B4-BE49-F238E27FC236}">
                 <a16:creationId xmlns:a16="http://schemas.microsoft.com/office/drawing/2014/main" id="{4BCC744E-5590-4542-B37F-B764470BF05E}"/>

</xml_diff>

<commit_message>
Update execution counts in index.ipynb for consistency
</commit_message>
<xml_diff>
--- a/Cars price.pptx
+++ b/Cars price.pptx
@@ -3860,7 +3860,7 @@
           <a:p>
             <a:fld id="{1C8322F6-1C60-46CF-968C-BC20E470F443}" type="datetimeFigureOut">
               <a:rPr lang="en-US" smtClean="0"/>
-              <a:t>5/2/2025</a:t>
+              <a:t>5/4/2025</a:t>
             </a:fld>
             <a:endParaRPr lang="en-US"/>
           </a:p>
@@ -4194,7 +4194,7 @@
           <a:p>
             <a:fld id="{1C8322F6-1C60-46CF-968C-BC20E470F443}" type="datetimeFigureOut">
               <a:rPr lang="en-US" smtClean="0"/>
-              <a:t>5/2/2025</a:t>
+              <a:t>5/4/2025</a:t>
             </a:fld>
             <a:endParaRPr lang="en-US"/>
           </a:p>
@@ -4447,7 +4447,7 @@
           <a:p>
             <a:fld id="{1C8322F6-1C60-46CF-968C-BC20E470F443}" type="datetimeFigureOut">
               <a:rPr lang="en-US" smtClean="0"/>
-              <a:t>5/2/2025</a:t>
+              <a:t>5/4/2025</a:t>
             </a:fld>
             <a:endParaRPr lang="en-US"/>
           </a:p>
@@ -4781,7 +4781,7 @@
           <a:p>
             <a:fld id="{1C8322F6-1C60-46CF-968C-BC20E470F443}" type="datetimeFigureOut">
               <a:rPr lang="en-US" smtClean="0"/>
-              <a:t>5/2/2025</a:t>
+              <a:t>5/4/2025</a:t>
             </a:fld>
             <a:endParaRPr lang="en-US"/>
           </a:p>
@@ -5062,7 +5062,7 @@
           <a:p>
             <a:fld id="{1C8322F6-1C60-46CF-968C-BC20E470F443}" type="datetimeFigureOut">
               <a:rPr lang="en-US" smtClean="0"/>
-              <a:t>5/2/2025</a:t>
+              <a:t>5/4/2025</a:t>
             </a:fld>
             <a:endParaRPr lang="en-US"/>
           </a:p>
@@ -5464,7 +5464,7 @@
           <a:p>
             <a:fld id="{1C8322F6-1C60-46CF-968C-BC20E470F443}" type="datetimeFigureOut">
               <a:rPr lang="en-US" smtClean="0"/>
-              <a:t>5/2/2025</a:t>
+              <a:t>5/4/2025</a:t>
             </a:fld>
             <a:endParaRPr lang="en-US"/>
           </a:p>
@@ -5925,7 +5925,7 @@
           <a:p>
             <a:fld id="{1C8322F6-1C60-46CF-968C-BC20E470F443}" type="datetimeFigureOut">
               <a:rPr lang="en-US" smtClean="0"/>
-              <a:t>5/2/2025</a:t>
+              <a:t>5/4/2025</a:t>
             </a:fld>
             <a:endParaRPr lang="en-US"/>
           </a:p>
@@ -6158,7 +6158,7 @@
           <a:p>
             <a:fld id="{1C8322F6-1C60-46CF-968C-BC20E470F443}" type="datetimeFigureOut">
               <a:rPr lang="en-US" smtClean="0"/>
-              <a:t>5/2/2025</a:t>
+              <a:t>5/4/2025</a:t>
             </a:fld>
             <a:endParaRPr lang="en-US"/>
           </a:p>
@@ -6357,7 +6357,7 @@
           <a:p>
             <a:fld id="{1C8322F6-1C60-46CF-968C-BC20E470F443}" type="datetimeFigureOut">
               <a:rPr lang="en-US" smtClean="0"/>
-              <a:t>5/2/2025</a:t>
+              <a:t>5/4/2025</a:t>
             </a:fld>
             <a:endParaRPr lang="en-US"/>
           </a:p>
@@ -6670,7 +6670,7 @@
           <a:p>
             <a:fld id="{1C8322F6-1C60-46CF-968C-BC20E470F443}" type="datetimeFigureOut">
               <a:rPr lang="en-US" smtClean="0"/>
-              <a:t>5/2/2025</a:t>
+              <a:t>5/4/2025</a:t>
             </a:fld>
             <a:endParaRPr lang="en-US"/>
           </a:p>
@@ -7134,7 +7134,7 @@
           <a:p>
             <a:fld id="{1C8322F6-1C60-46CF-968C-BC20E470F443}" type="datetimeFigureOut">
               <a:rPr lang="en-US" smtClean="0"/>
-              <a:t>5/2/2025</a:t>
+              <a:t>5/4/2025</a:t>
             </a:fld>
             <a:endParaRPr lang="en-US"/>
           </a:p>
@@ -7547,7 +7547,7 @@
           <a:p>
             <a:fld id="{1C8322F6-1C60-46CF-968C-BC20E470F443}" type="datetimeFigureOut">
               <a:rPr lang="en-US" smtClean="0"/>
-              <a:t>5/2/2025</a:t>
+              <a:t>5/4/2025</a:t>
             </a:fld>
             <a:endParaRPr lang="en-US"/>
           </a:p>
@@ -9693,7 +9693,7 @@
       </p:grpSpPr>
       <p:cxnSp>
         <p:nvCxnSpPr>
-          <p:cNvPr id="10" name="Straight Connector 9">
+          <p:cNvPr id="44" name="Straight Connector 43">
             <a:extLst>
               <a:ext uri="{FF2B5EF4-FFF2-40B4-BE49-F238E27FC236}">
                 <a16:creationId xmlns:a16="http://schemas.microsoft.com/office/drawing/2014/main" id="{A240FCEE-B6E2-46D0-9BB0-F45F79545E9D}"/>
@@ -9745,7 +9745,7 @@
       </p:cxnSp>
       <p:cxnSp>
         <p:nvCxnSpPr>
-          <p:cNvPr id="12" name="Straight Connector 11">
+          <p:cNvPr id="46" name="Straight Connector 45">
             <a:extLst>
               <a:ext uri="{FF2B5EF4-FFF2-40B4-BE49-F238E27FC236}">
                 <a16:creationId xmlns:a16="http://schemas.microsoft.com/office/drawing/2014/main" id="{3BD2FB83-3783-4477-80B5-DA5BF10BAF57}"/>
@@ -9797,7 +9797,7 @@
       </p:cxnSp>
       <p:cxnSp>
         <p:nvCxnSpPr>
-          <p:cNvPr id="14" name="Straight Connector 13">
+          <p:cNvPr id="48" name="Straight Connector 47">
             <a:extLst>
               <a:ext uri="{FF2B5EF4-FFF2-40B4-BE49-F238E27FC236}">
                 <a16:creationId xmlns:a16="http://schemas.microsoft.com/office/drawing/2014/main" id="{E83EA203-71D5-49C0-9626-FFA8E46787B0}"/>
@@ -9849,10 +9849,10 @@
       </p:cxnSp>
       <p:sp useBgFill="1">
         <p:nvSpPr>
-          <p:cNvPr id="16" name="Rectangle 15">
-            <a:extLst>
-              <a:ext uri="{FF2B5EF4-FFF2-40B4-BE49-F238E27FC236}">
-                <a16:creationId xmlns:a16="http://schemas.microsoft.com/office/drawing/2014/main" id="{D26BC87E-DCC8-4E66-972D-A587756DF30A}"/>
+          <p:cNvPr id="50" name="Rectangle 49">
+            <a:extLst>
+              <a:ext uri="{FF2B5EF4-FFF2-40B4-BE49-F238E27FC236}">
+                <a16:creationId xmlns:a16="http://schemas.microsoft.com/office/drawing/2014/main" id="{7D2EF33D-68BD-428C-B26E-2F4962407A12}"/>
               </a:ext>
               <a:ext uri="{C183D7F6-B498-43B3-948B-1728B52AA6E4}">
                 <adec:decorative xmlns:adec="http://schemas.microsoft.com/office/drawing/2017/decorative" val="1"/>
@@ -9925,8 +9925,8 @@
         </p:nvSpPr>
         <p:spPr>
           <a:xfrm>
-            <a:off x="521208" y="822960"/>
-            <a:ext cx="3898392" cy="5049781"/>
+            <a:off x="521208" y="822961"/>
+            <a:ext cx="5003290" cy="4282440"/>
           </a:xfrm>
         </p:spPr>
         <p:txBody>
@@ -9936,53 +9936,29 @@
           <a:lstStyle/>
           <a:p>
             <a:r>
-              <a:rPr lang="en-US" sz="1900" b="1" dirty="0"/>
+              <a:rPr lang="en-US" sz="2300" b="1"/>
               <a:t>Modeling and Evaluation</a:t>
             </a:r>
             <a:br>
-              <a:rPr lang="en-US" sz="1900" dirty="0"/>
+              <a:rPr lang="en-US" sz="2300"/>
             </a:br>
             <a:r>
-              <a:rPr lang="en-US" sz="1900" dirty="0"/>
-              <a:t>This slide details the modeling process: features (model, hp, year, mileage, </a:t>
-            </a:r>
-            <a:r>
-              <a:rPr lang="en-US" sz="1900" dirty="0" err="1"/>
-              <a:t>offerType</a:t>
-            </a:r>
-            <a:r>
-              <a:rPr lang="en-US" sz="1900" dirty="0"/>
-              <a:t>) and target (price) are selected, split into training and test sets (70-30 split), and scaled using </a:t>
-            </a:r>
-            <a:r>
-              <a:rPr lang="en-US" sz="1900" dirty="0" err="1"/>
-              <a:t>StandardScaler</a:t>
-            </a:r>
-            <a:r>
-              <a:rPr lang="en-US" sz="1900" dirty="0"/>
-              <a:t>. A </a:t>
-            </a:r>
-            <a:r>
-              <a:rPr lang="en-US" sz="1900" dirty="0" err="1"/>
-              <a:t>RandomForestRegressor</a:t>
-            </a:r>
-            <a:r>
-              <a:rPr lang="en-US" sz="1900" dirty="0"/>
-              <a:t> model is trained, achieving a 91.66% accuracy (R² score) on the test set, with comparisons to a KNeighborsRegressor model.</a:t>
+              <a:rPr lang="en-US" sz="2300"/>
+              <a:t>This slide details the modeling process: features (model, hp, year, mileage, offerType) and target (price) are selected, split into training and test sets (70-30 split), and scaled using StandardScaler. A RandomForestRegressor model is trained, achieving a 91.66% accuracy (R² score) on the test set, with comparisons to a KNeighborsRegressor model.</a:t>
             </a:r>
             <a:br>
-              <a:rPr lang="en-US" sz="1900" dirty="0"/>
+              <a:rPr lang="en-US" sz="2300"/>
             </a:br>
-            <a:endParaRPr lang="en-US" sz="1900" dirty="0"/>
+            <a:endParaRPr lang="en-US" sz="2300"/>
           </a:p>
         </p:txBody>
       </p:sp>
       <p:cxnSp>
         <p:nvCxnSpPr>
-          <p:cNvPr id="18" name="Straight Connector 17">
-            <a:extLst>
-              <a:ext uri="{FF2B5EF4-FFF2-40B4-BE49-F238E27FC236}">
-                <a16:creationId xmlns:a16="http://schemas.microsoft.com/office/drawing/2014/main" id="{8B45C962-0D68-4A01-9627-70DEBBC363C7}"/>
+          <p:cNvPr id="52" name="Straight Connector 51">
+            <a:extLst>
+              <a:ext uri="{FF2B5EF4-FFF2-40B4-BE49-F238E27FC236}">
+                <a16:creationId xmlns:a16="http://schemas.microsoft.com/office/drawing/2014/main" id="{BB0822C5-45F8-48C5-867F-0DE853868476}"/>
               </a:ext>
               <a:ext uri="{C183D7F6-B498-43B3-948B-1728B52AA6E4}">
                 <adec:decorative xmlns:adec="http://schemas.microsoft.com/office/drawing/2017/decorative" val="1"/>
@@ -10001,9 +9977,9 @@
           </p:nvPr>
         </p:nvCxnSpPr>
         <p:spPr>
-          <a:xfrm flipH="1">
-            <a:off x="577175" y="571500"/>
-            <a:ext cx="11054799" cy="0"/>
+          <a:xfrm>
+            <a:off x="6629400" y="573488"/>
+            <a:ext cx="0" cy="5717041"/>
           </a:xfrm>
           <a:prstGeom prst="line">
             <a:avLst/>
@@ -10031,10 +10007,10 @@
       </p:cxnSp>
       <p:cxnSp>
         <p:nvCxnSpPr>
-          <p:cNvPr id="20" name="Straight Connector 19">
-            <a:extLst>
-              <a:ext uri="{FF2B5EF4-FFF2-40B4-BE49-F238E27FC236}">
-                <a16:creationId xmlns:a16="http://schemas.microsoft.com/office/drawing/2014/main" id="{F1D89FBF-493B-4E7D-B511-7E40674F6323}"/>
+          <p:cNvPr id="54" name="Straight Connector 53">
+            <a:extLst>
+              <a:ext uri="{FF2B5EF4-FFF2-40B4-BE49-F238E27FC236}">
+                <a16:creationId xmlns:a16="http://schemas.microsoft.com/office/drawing/2014/main" id="{A91E38C7-3164-416B-A453-D3B6F612D325}"/>
               </a:ext>
               <a:ext uri="{C183D7F6-B498-43B3-948B-1728B52AA6E4}">
                 <adec:decorative xmlns:adec="http://schemas.microsoft.com/office/drawing/2017/decorative" val="1"/>
@@ -10053,9 +10029,9 @@
           </p:nvPr>
         </p:nvCxnSpPr>
         <p:spPr>
-          <a:xfrm>
-            <a:off x="5524500" y="573971"/>
-            <a:ext cx="0" cy="5712529"/>
+          <a:xfrm flipH="1">
+            <a:off x="577175" y="571500"/>
+            <a:ext cx="11054799" cy="0"/>
           </a:xfrm>
           <a:prstGeom prst="line">
             <a:avLst/>
@@ -10083,10 +10059,10 @@
       </p:cxnSp>
       <p:pic>
         <p:nvPicPr>
-          <p:cNvPr id="5" name="Content Placeholder 4" descr="A screenshot of a computer program&#10;&#10;AI-generated content may be incorrect.">
-            <a:extLst>
-              <a:ext uri="{FF2B5EF4-FFF2-40B4-BE49-F238E27FC236}">
-                <a16:creationId xmlns:a16="http://schemas.microsoft.com/office/drawing/2014/main" id="{57CEAB2C-086F-7854-2881-41897B0F42C1}"/>
+          <p:cNvPr id="7" name="Content Placeholder 6" descr="A screen shot of a computer program&#10;&#10;AI-generated content may be incorrect.">
+            <a:extLst>
+              <a:ext uri="{FF2B5EF4-FFF2-40B4-BE49-F238E27FC236}">
+                <a16:creationId xmlns:a16="http://schemas.microsoft.com/office/drawing/2014/main" id="{79BBD27C-DA30-437F-4164-D420E63C15AC}"/>
               </a:ext>
             </a:extLst>
           </p:cNvPr>
@@ -10098,21 +10074,14 @@
           </p:nvPr>
         </p:nvPicPr>
         <p:blipFill>
-          <a:blip r:embed="rId2">
-            <a:extLst>
-              <a:ext uri="{28A0092B-C50C-407E-A947-70E740481C1C}">
-                <a14:useLocalDpi xmlns:a14="http://schemas.microsoft.com/office/drawing/2010/main" val="0"/>
-              </a:ext>
-            </a:extLst>
-          </a:blip>
-          <a:stretch>
-            <a:fillRect/>
-          </a:stretch>
+          <a:blip r:embed="rId2"/>
+          <a:srcRect r="8254" b="-3"/>
+          <a:stretch/>
         </p:blipFill>
         <p:spPr>
           <a:xfrm>
-            <a:off x="6063631" y="853692"/>
-            <a:ext cx="5293618" cy="4367235"/>
+            <a:off x="6905284" y="1671095"/>
+            <a:ext cx="4714892" cy="3507521"/>
           </a:xfrm>
           <a:prstGeom prst="rect">
             <a:avLst/>
@@ -10121,10 +10090,10 @@
       </p:pic>
       <p:cxnSp>
         <p:nvCxnSpPr>
-          <p:cNvPr id="22" name="Straight Connector 21">
-            <a:extLst>
-              <a:ext uri="{FF2B5EF4-FFF2-40B4-BE49-F238E27FC236}">
-                <a16:creationId xmlns:a16="http://schemas.microsoft.com/office/drawing/2014/main" id="{4BCC744E-5590-4542-B37F-B764470BF05E}"/>
+          <p:cNvPr id="56" name="Straight Connector 55">
+            <a:extLst>
+              <a:ext uri="{FF2B5EF4-FFF2-40B4-BE49-F238E27FC236}">
+                <a16:creationId xmlns:a16="http://schemas.microsoft.com/office/drawing/2014/main" id="{EC3B131B-2BD8-4155-8C64-85668842E2EA}"/>
               </a:ext>
               <a:ext uri="{C183D7F6-B498-43B3-948B-1728B52AA6E4}">
                 <adec:decorative xmlns:adec="http://schemas.microsoft.com/office/drawing/2017/decorative" val="1"/>
@@ -10144,8 +10113,8 @@
         </p:nvCxnSpPr>
         <p:spPr>
           <a:xfrm flipH="1">
-            <a:off x="577176" y="6286500"/>
-            <a:ext cx="11043324" cy="0"/>
+            <a:off x="584291" y="6287701"/>
+            <a:ext cx="11023419" cy="0"/>
           </a:xfrm>
           <a:prstGeom prst="line">
             <a:avLst/>

</xml_diff>

<commit_message>
Update execution count and remove 'offerType' from features in model training for accuracy improvement in index.ipynb
</commit_message>
<xml_diff>
--- a/Cars price.pptx
+++ b/Cars price.pptx
@@ -3860,7 +3860,7 @@
           <a:p>
             <a:fld id="{1C8322F6-1C60-46CF-968C-BC20E470F443}" type="datetimeFigureOut">
               <a:rPr lang="en-US" smtClean="0"/>
-              <a:t>5/4/2025</a:t>
+              <a:t>5/7/2025</a:t>
             </a:fld>
             <a:endParaRPr lang="en-US"/>
           </a:p>
@@ -4194,7 +4194,7 @@
           <a:p>
             <a:fld id="{1C8322F6-1C60-46CF-968C-BC20E470F443}" type="datetimeFigureOut">
               <a:rPr lang="en-US" smtClean="0"/>
-              <a:t>5/4/2025</a:t>
+              <a:t>5/7/2025</a:t>
             </a:fld>
             <a:endParaRPr lang="en-US"/>
           </a:p>
@@ -4447,7 +4447,7 @@
           <a:p>
             <a:fld id="{1C8322F6-1C60-46CF-968C-BC20E470F443}" type="datetimeFigureOut">
               <a:rPr lang="en-US" smtClean="0"/>
-              <a:t>5/4/2025</a:t>
+              <a:t>5/7/2025</a:t>
             </a:fld>
             <a:endParaRPr lang="en-US"/>
           </a:p>
@@ -4781,7 +4781,7 @@
           <a:p>
             <a:fld id="{1C8322F6-1C60-46CF-968C-BC20E470F443}" type="datetimeFigureOut">
               <a:rPr lang="en-US" smtClean="0"/>
-              <a:t>5/4/2025</a:t>
+              <a:t>5/7/2025</a:t>
             </a:fld>
             <a:endParaRPr lang="en-US"/>
           </a:p>
@@ -5062,7 +5062,7 @@
           <a:p>
             <a:fld id="{1C8322F6-1C60-46CF-968C-BC20E470F443}" type="datetimeFigureOut">
               <a:rPr lang="en-US" smtClean="0"/>
-              <a:t>5/4/2025</a:t>
+              <a:t>5/7/2025</a:t>
             </a:fld>
             <a:endParaRPr lang="en-US"/>
           </a:p>
@@ -5464,7 +5464,7 @@
           <a:p>
             <a:fld id="{1C8322F6-1C60-46CF-968C-BC20E470F443}" type="datetimeFigureOut">
               <a:rPr lang="en-US" smtClean="0"/>
-              <a:t>5/4/2025</a:t>
+              <a:t>5/7/2025</a:t>
             </a:fld>
             <a:endParaRPr lang="en-US"/>
           </a:p>
@@ -5925,7 +5925,7 @@
           <a:p>
             <a:fld id="{1C8322F6-1C60-46CF-968C-BC20E470F443}" type="datetimeFigureOut">
               <a:rPr lang="en-US" smtClean="0"/>
-              <a:t>5/4/2025</a:t>
+              <a:t>5/7/2025</a:t>
             </a:fld>
             <a:endParaRPr lang="en-US"/>
           </a:p>
@@ -6158,7 +6158,7 @@
           <a:p>
             <a:fld id="{1C8322F6-1C60-46CF-968C-BC20E470F443}" type="datetimeFigureOut">
               <a:rPr lang="en-US" smtClean="0"/>
-              <a:t>5/4/2025</a:t>
+              <a:t>5/7/2025</a:t>
             </a:fld>
             <a:endParaRPr lang="en-US"/>
           </a:p>
@@ -6357,7 +6357,7 @@
           <a:p>
             <a:fld id="{1C8322F6-1C60-46CF-968C-BC20E470F443}" type="datetimeFigureOut">
               <a:rPr lang="en-US" smtClean="0"/>
-              <a:t>5/4/2025</a:t>
+              <a:t>5/7/2025</a:t>
             </a:fld>
             <a:endParaRPr lang="en-US"/>
           </a:p>
@@ -6670,7 +6670,7 @@
           <a:p>
             <a:fld id="{1C8322F6-1C60-46CF-968C-BC20E470F443}" type="datetimeFigureOut">
               <a:rPr lang="en-US" smtClean="0"/>
-              <a:t>5/4/2025</a:t>
+              <a:t>5/7/2025</a:t>
             </a:fld>
             <a:endParaRPr lang="en-US"/>
           </a:p>
@@ -7134,7 +7134,7 @@
           <a:p>
             <a:fld id="{1C8322F6-1C60-46CF-968C-BC20E470F443}" type="datetimeFigureOut">
               <a:rPr lang="en-US" smtClean="0"/>
-              <a:t>5/4/2025</a:t>
+              <a:t>5/7/2025</a:t>
             </a:fld>
             <a:endParaRPr lang="en-US"/>
           </a:p>
@@ -7547,7 +7547,7 @@
           <a:p>
             <a:fld id="{1C8322F6-1C60-46CF-968C-BC20E470F443}" type="datetimeFigureOut">
               <a:rPr lang="en-US" smtClean="0"/>
-              <a:t>5/4/2025</a:t>
+              <a:t>5/7/2025</a:t>
             </a:fld>
             <a:endParaRPr lang="en-US"/>
           </a:p>
@@ -9167,7 +9167,7 @@
       </p:grpSpPr>
       <p:cxnSp>
         <p:nvCxnSpPr>
-          <p:cNvPr id="12" name="Straight Connector 11">
+          <p:cNvPr id="29" name="Straight Connector 28">
             <a:extLst>
               <a:ext uri="{FF2B5EF4-FFF2-40B4-BE49-F238E27FC236}">
                 <a16:creationId xmlns:a16="http://schemas.microsoft.com/office/drawing/2014/main" id="{A240FCEE-B6E2-46D0-9BB0-F45F79545E9D}"/>
@@ -9219,7 +9219,7 @@
       </p:cxnSp>
       <p:cxnSp>
         <p:nvCxnSpPr>
-          <p:cNvPr id="14" name="Straight Connector 13">
+          <p:cNvPr id="31" name="Straight Connector 30">
             <a:extLst>
               <a:ext uri="{FF2B5EF4-FFF2-40B4-BE49-F238E27FC236}">
                 <a16:creationId xmlns:a16="http://schemas.microsoft.com/office/drawing/2014/main" id="{3BD2FB83-3783-4477-80B5-DA5BF10BAF57}"/>
@@ -9271,7 +9271,7 @@
       </p:cxnSp>
       <p:cxnSp>
         <p:nvCxnSpPr>
-          <p:cNvPr id="16" name="Straight Connector 15">
+          <p:cNvPr id="33" name="Straight Connector 32">
             <a:extLst>
               <a:ext uri="{FF2B5EF4-FFF2-40B4-BE49-F238E27FC236}">
                 <a16:creationId xmlns:a16="http://schemas.microsoft.com/office/drawing/2014/main" id="{E83EA203-71D5-49C0-9626-FFA8E46787B0}"/>
@@ -9323,10 +9323,10 @@
       </p:cxnSp>
       <p:sp useBgFill="1">
         <p:nvSpPr>
-          <p:cNvPr id="18" name="Rectangle 17">
-            <a:extLst>
-              <a:ext uri="{FF2B5EF4-FFF2-40B4-BE49-F238E27FC236}">
-                <a16:creationId xmlns:a16="http://schemas.microsoft.com/office/drawing/2014/main" id="{C63AB9E1-499E-41EB-A74E-905920CCDF67}"/>
+          <p:cNvPr id="35" name="Rectangle 34">
+            <a:extLst>
+              <a:ext uri="{FF2B5EF4-FFF2-40B4-BE49-F238E27FC236}">
+                <a16:creationId xmlns:a16="http://schemas.microsoft.com/office/drawing/2014/main" id="{D26BC87E-DCC8-4E66-972D-A587756DF30A}"/>
               </a:ext>
               <a:ext uri="{C183D7F6-B498-43B3-948B-1728B52AA6E4}">
                 <adec:decorative xmlns:adec="http://schemas.microsoft.com/office/drawing/2017/decorative" val="1"/>
@@ -9399,8 +9399,8 @@
         </p:nvSpPr>
         <p:spPr>
           <a:xfrm>
-            <a:off x="576072" y="822959"/>
-            <a:ext cx="10956558" cy="1598957"/>
+            <a:off x="521208" y="822960"/>
+            <a:ext cx="3898392" cy="5049781"/>
           </a:xfrm>
         </p:spPr>
         <p:txBody>
@@ -9410,61 +9410,29 @@
           <a:lstStyle/>
           <a:p>
             <a:r>
-              <a:rPr lang="en-US" sz="1200" b="1" dirty="0"/>
+              <a:rPr lang="en-US" sz="2300" b="1"/>
               <a:t>Data Preprocessing: Encoding Categorical Variables</a:t>
             </a:r>
             <a:br>
-              <a:rPr lang="en-US" sz="1200" dirty="0"/>
+              <a:rPr lang="en-US" sz="2300"/>
             </a:br>
             <a:r>
-              <a:rPr lang="en-US" sz="1200" dirty="0"/>
-              <a:t>This slide shows the conversion of categorical columns "model" and "</a:t>
-            </a:r>
-            <a:r>
-              <a:rPr lang="en-US" sz="1200" dirty="0" err="1"/>
-              <a:t>offerType</a:t>
-            </a:r>
-            <a:r>
-              <a:rPr lang="en-US" sz="1200" dirty="0"/>
-              <a:t>" into numerical codes using </a:t>
-            </a:r>
-            <a:r>
-              <a:rPr lang="en-US" sz="1200" dirty="0" err="1"/>
-              <a:t>astype</a:t>
-            </a:r>
-            <a:r>
-              <a:rPr lang="en-US" sz="1200" dirty="0"/>
-              <a:t>('category').</a:t>
-            </a:r>
-            <a:r>
-              <a:rPr lang="en-US" sz="1200" dirty="0" err="1"/>
-              <a:t>cat.codes</a:t>
-            </a:r>
-            <a:r>
-              <a:rPr lang="en-US" sz="1200" dirty="0"/>
-              <a:t>, enabling these features to be used in the </a:t>
-            </a:r>
-            <a:r>
-              <a:rPr lang="en-US" sz="1200" dirty="0" err="1"/>
-              <a:t>RandomForestRegressor</a:t>
-            </a:r>
-            <a:r>
-              <a:rPr lang="en-US" sz="1200" dirty="0"/>
-              <a:t> model for price prediction.</a:t>
+              <a:rPr lang="en-US" sz="2300"/>
+              <a:t>This slide shows the conversion of categorical columns "model" and "offerType" into numerical codes using astype('category').cat.codes, enabling these features to be used in the RandomForestRegressor model for price prediction.</a:t>
             </a:r>
             <a:br>
-              <a:rPr lang="en-US" sz="1200" dirty="0"/>
+              <a:rPr lang="en-US" sz="2300"/>
             </a:br>
-            <a:endParaRPr lang="en-US" sz="1200" dirty="0"/>
+            <a:endParaRPr lang="en-US" sz="2300"/>
           </a:p>
         </p:txBody>
       </p:sp>
       <p:cxnSp>
         <p:nvCxnSpPr>
-          <p:cNvPr id="20" name="Straight Connector 19">
-            <a:extLst>
-              <a:ext uri="{FF2B5EF4-FFF2-40B4-BE49-F238E27FC236}">
-                <a16:creationId xmlns:a16="http://schemas.microsoft.com/office/drawing/2014/main" id="{CEEA40C4-6B9E-4B9E-8CDF-A0C572462EAD}"/>
+          <p:cNvPr id="37" name="Straight Connector 36">
+            <a:extLst>
+              <a:ext uri="{FF2B5EF4-FFF2-40B4-BE49-F238E27FC236}">
+                <a16:creationId xmlns:a16="http://schemas.microsoft.com/office/drawing/2014/main" id="{8B45C962-0D68-4A01-9627-70DEBBC363C7}"/>
               </a:ext>
               <a:ext uri="{C183D7F6-B498-43B3-948B-1728B52AA6E4}">
                 <adec:decorative xmlns:adec="http://schemas.microsoft.com/office/drawing/2017/decorative" val="1"/>
@@ -9484,8 +9452,60 @@
         </p:nvCxnSpPr>
         <p:spPr>
           <a:xfrm flipH="1">
-            <a:off x="565869" y="573757"/>
+            <a:off x="577175" y="571500"/>
             <a:ext cx="11054799" cy="0"/>
+          </a:xfrm>
+          <a:prstGeom prst="line">
+            <a:avLst/>
+          </a:prstGeom>
+          <a:ln>
+            <a:solidFill>
+              <a:schemeClr val="tx1"/>
+            </a:solidFill>
+          </a:ln>
+        </p:spPr>
+        <p:style>
+          <a:lnRef idx="1">
+            <a:schemeClr val="accent1"/>
+          </a:lnRef>
+          <a:fillRef idx="0">
+            <a:schemeClr val="accent1"/>
+          </a:fillRef>
+          <a:effectRef idx="0">
+            <a:schemeClr val="accent1"/>
+          </a:effectRef>
+          <a:fontRef idx="minor">
+            <a:schemeClr val="tx1"/>
+          </a:fontRef>
+        </p:style>
+      </p:cxnSp>
+      <p:cxnSp>
+        <p:nvCxnSpPr>
+          <p:cNvPr id="39" name="Straight Connector 38">
+            <a:extLst>
+              <a:ext uri="{FF2B5EF4-FFF2-40B4-BE49-F238E27FC236}">
+                <a16:creationId xmlns:a16="http://schemas.microsoft.com/office/drawing/2014/main" id="{F1D89FBF-493B-4E7D-B511-7E40674F6323}"/>
+              </a:ext>
+              <a:ext uri="{C183D7F6-B498-43B3-948B-1728B52AA6E4}">
+                <adec:decorative xmlns:adec="http://schemas.microsoft.com/office/drawing/2017/decorative" val="1"/>
+              </a:ext>
+            </a:extLst>
+          </p:cNvPr>
+          <p:cNvCxnSpPr>
+            <a:cxnSpLocks noGrp="1" noRot="1" noChangeAspect="1" noMove="1" noResize="1" noEditPoints="1" noAdjustHandles="1" noChangeArrowheads="1" noChangeShapeType="1"/>
+          </p:cNvCxnSpPr>
+          <p:nvPr>
+            <p:extLst>
+              <p:ext uri="{386F3935-93C4-4BCD-93E2-E3B085C9AB24}">
+                <p16:designElem xmlns:p16="http://schemas.microsoft.com/office/powerpoint/2015/main" val="1"/>
+              </p:ext>
+            </p:extLst>
+          </p:nvPr>
+        </p:nvCxnSpPr>
+        <p:spPr>
+          <a:xfrm>
+            <a:off x="5524500" y="573971"/>
+            <a:ext cx="0" cy="5712529"/>
           </a:xfrm>
           <a:prstGeom prst="line">
             <a:avLst/>
@@ -9541,8 +9561,8 @@
         </p:blipFill>
         <p:spPr>
           <a:xfrm>
-            <a:off x="580406" y="2702796"/>
-            <a:ext cx="11027305" cy="1598958"/>
+            <a:off x="5800384" y="2615351"/>
+            <a:ext cx="5820112" cy="843916"/>
           </a:xfrm>
           <a:prstGeom prst="rect">
             <a:avLst/>
@@ -9551,10 +9571,10 @@
       </p:pic>
       <p:cxnSp>
         <p:nvCxnSpPr>
-          <p:cNvPr id="22" name="Straight Connector 21">
-            <a:extLst>
-              <a:ext uri="{FF2B5EF4-FFF2-40B4-BE49-F238E27FC236}">
-                <a16:creationId xmlns:a16="http://schemas.microsoft.com/office/drawing/2014/main" id="{179A2A06-A424-4BBD-A8A4-293F16F1BE2B}"/>
+          <p:cNvPr id="41" name="Straight Connector 40">
+            <a:extLst>
+              <a:ext uri="{FF2B5EF4-FFF2-40B4-BE49-F238E27FC236}">
+                <a16:creationId xmlns:a16="http://schemas.microsoft.com/office/drawing/2014/main" id="{4BCC744E-5590-4542-B37F-B764470BF05E}"/>
               </a:ext>
               <a:ext uri="{C183D7F6-B498-43B3-948B-1728B52AA6E4}">
                 <adec:decorative xmlns:adec="http://schemas.microsoft.com/office/drawing/2017/decorative" val="1"/>
@@ -9574,60 +9594,8 @@
         </p:nvCxnSpPr>
         <p:spPr>
           <a:xfrm flipH="1">
-            <a:off x="571501" y="5240579"/>
-            <a:ext cx="11036211" cy="0"/>
-          </a:xfrm>
-          <a:prstGeom prst="line">
-            <a:avLst/>
-          </a:prstGeom>
-          <a:ln>
-            <a:solidFill>
-              <a:schemeClr val="tx1"/>
-            </a:solidFill>
-          </a:ln>
-        </p:spPr>
-        <p:style>
-          <a:lnRef idx="1">
-            <a:schemeClr val="accent1"/>
-          </a:lnRef>
-          <a:fillRef idx="0">
-            <a:schemeClr val="accent1"/>
-          </a:fillRef>
-          <a:effectRef idx="0">
-            <a:schemeClr val="accent1"/>
-          </a:effectRef>
-          <a:fontRef idx="minor">
-            <a:schemeClr val="tx1"/>
-          </a:fontRef>
-        </p:style>
-      </p:cxnSp>
-      <p:cxnSp>
-        <p:nvCxnSpPr>
-          <p:cNvPr id="24" name="Straight Connector 23">
-            <a:extLst>
-              <a:ext uri="{FF2B5EF4-FFF2-40B4-BE49-F238E27FC236}">
-                <a16:creationId xmlns:a16="http://schemas.microsoft.com/office/drawing/2014/main" id="{AE458AAC-F667-498F-A263-A8C7AB4FC960}"/>
-              </a:ext>
-              <a:ext uri="{C183D7F6-B498-43B3-948B-1728B52AA6E4}">
-                <adec:decorative xmlns:adec="http://schemas.microsoft.com/office/drawing/2017/decorative" val="1"/>
-              </a:ext>
-            </a:extLst>
-          </p:cNvPr>
-          <p:cNvCxnSpPr>
-            <a:cxnSpLocks noGrp="1" noRot="1" noChangeAspect="1" noMove="1" noResize="1" noEditPoints="1" noAdjustHandles="1" noChangeArrowheads="1" noChangeShapeType="1"/>
-          </p:cNvCxnSpPr>
-          <p:nvPr>
-            <p:extLst>
-              <p:ext uri="{386F3935-93C4-4BCD-93E2-E3B085C9AB24}">
-                <p16:designElem xmlns:p16="http://schemas.microsoft.com/office/powerpoint/2015/main" val="1"/>
-              </p:ext>
-            </p:extLst>
-          </p:nvPr>
-        </p:nvCxnSpPr>
-        <p:spPr>
-          <a:xfrm flipH="1">
-            <a:off x="561819" y="6289514"/>
-            <a:ext cx="11054799" cy="0"/>
+            <a:off x="577176" y="6286500"/>
+            <a:ext cx="11043324" cy="0"/>
           </a:xfrm>
           <a:prstGeom prst="line">
             <a:avLst/>
@@ -9693,7 +9661,7 @@
       </p:grpSpPr>
       <p:cxnSp>
         <p:nvCxnSpPr>
-          <p:cNvPr id="44" name="Straight Connector 43">
+          <p:cNvPr id="78" name="Straight Connector 77">
             <a:extLst>
               <a:ext uri="{FF2B5EF4-FFF2-40B4-BE49-F238E27FC236}">
                 <a16:creationId xmlns:a16="http://schemas.microsoft.com/office/drawing/2014/main" id="{A240FCEE-B6E2-46D0-9BB0-F45F79545E9D}"/>
@@ -9745,7 +9713,7 @@
       </p:cxnSp>
       <p:cxnSp>
         <p:nvCxnSpPr>
-          <p:cNvPr id="46" name="Straight Connector 45">
+          <p:cNvPr id="80" name="Straight Connector 79">
             <a:extLst>
               <a:ext uri="{FF2B5EF4-FFF2-40B4-BE49-F238E27FC236}">
                 <a16:creationId xmlns:a16="http://schemas.microsoft.com/office/drawing/2014/main" id="{3BD2FB83-3783-4477-80B5-DA5BF10BAF57}"/>
@@ -9797,7 +9765,7 @@
       </p:cxnSp>
       <p:cxnSp>
         <p:nvCxnSpPr>
-          <p:cNvPr id="48" name="Straight Connector 47">
+          <p:cNvPr id="82" name="Straight Connector 81">
             <a:extLst>
               <a:ext uri="{FF2B5EF4-FFF2-40B4-BE49-F238E27FC236}">
                 <a16:creationId xmlns:a16="http://schemas.microsoft.com/office/drawing/2014/main" id="{E83EA203-71D5-49C0-9626-FFA8E46787B0}"/>
@@ -9849,10 +9817,10 @@
       </p:cxnSp>
       <p:sp useBgFill="1">
         <p:nvSpPr>
-          <p:cNvPr id="50" name="Rectangle 49">
-            <a:extLst>
-              <a:ext uri="{FF2B5EF4-FFF2-40B4-BE49-F238E27FC236}">
-                <a16:creationId xmlns:a16="http://schemas.microsoft.com/office/drawing/2014/main" id="{7D2EF33D-68BD-428C-B26E-2F4962407A12}"/>
+          <p:cNvPr id="84" name="Rectangle 83">
+            <a:extLst>
+              <a:ext uri="{FF2B5EF4-FFF2-40B4-BE49-F238E27FC236}">
+                <a16:creationId xmlns:a16="http://schemas.microsoft.com/office/drawing/2014/main" id="{D26BC87E-DCC8-4E66-972D-A587756DF30A}"/>
               </a:ext>
               <a:ext uri="{C183D7F6-B498-43B3-948B-1728B52AA6E4}">
                 <adec:decorative xmlns:adec="http://schemas.microsoft.com/office/drawing/2017/decorative" val="1"/>
@@ -9925,8 +9893,8 @@
         </p:nvSpPr>
         <p:spPr>
           <a:xfrm>
-            <a:off x="521208" y="822961"/>
-            <a:ext cx="5003290" cy="4282440"/>
+            <a:off x="521208" y="822960"/>
+            <a:ext cx="3898392" cy="5049781"/>
           </a:xfrm>
         </p:spPr>
         <p:txBody>
@@ -9936,29 +9904,60 @@
           <a:lstStyle/>
           <a:p>
             <a:r>
-              <a:rPr lang="en-US" sz="2300" b="1"/>
+              <a:rPr lang="en-US" sz="1900" b="1" dirty="0"/>
               <a:t>Modeling and Evaluation</a:t>
             </a:r>
             <a:br>
-              <a:rPr lang="en-US" sz="2300"/>
+              <a:rPr lang="en-US" sz="1900" dirty="0"/>
             </a:br>
             <a:r>
-              <a:rPr lang="en-US" sz="2300"/>
-              <a:t>This slide details the modeling process: features (model, hp, year, mileage, offerType) and target (price) are selected, split into training and test sets (70-30 split), and scaled using StandardScaler. A RandomForestRegressor model is trained, achieving a 91.66% accuracy (R² score) on the test set, with comparisons to a KNeighborsRegressor model.</a:t>
+              <a:rPr lang="en-US" sz="1900" dirty="0">
+                <a:effectLst/>
+              </a:rPr>
+              <a:t>The image shows Python code for training a machine learning model using Scikit-learn. The code loads data (e.g., "model", "hp", "year", "mileage") to predict "price". It splits the data into training and testing sets with a 30% test size, then scales the data using </a:t>
+            </a:r>
+            <a:r>
+              <a:rPr lang="en-US" sz="1900" dirty="0" err="1">
+                <a:effectLst/>
+              </a:rPr>
+              <a:t>StandardScaler</a:t>
+            </a:r>
+            <a:r>
+              <a:rPr lang="en-US" sz="1900" dirty="0">
+                <a:effectLst/>
+              </a:rPr>
+              <a:t>. A </a:t>
+            </a:r>
+            <a:r>
+              <a:rPr lang="en-US" sz="1900" dirty="0" err="1">
+                <a:effectLst/>
+              </a:rPr>
+              <a:t>RandomForestRegressor</a:t>
+            </a:r>
+            <a:r>
+              <a:rPr lang="en-US" sz="1900" dirty="0">
+                <a:effectLst/>
+              </a:rPr>
+              <a:t> model is trained, and its accuracy is evaluated using the R² score, achieving 92.33%.</a:t>
             </a:r>
             <a:br>
-              <a:rPr lang="en-US" sz="2300"/>
+              <a:rPr lang="en-US" sz="1900" dirty="0">
+                <a:effectLst/>
+              </a:rPr>
             </a:br>
-            <a:endParaRPr lang="en-US" sz="2300"/>
+            <a:br>
+              <a:rPr lang="en-US" sz="1900" dirty="0"/>
+            </a:br>
+            <a:endParaRPr lang="en-US" sz="1900" dirty="0"/>
           </a:p>
         </p:txBody>
       </p:sp>
       <p:cxnSp>
         <p:nvCxnSpPr>
-          <p:cNvPr id="52" name="Straight Connector 51">
-            <a:extLst>
-              <a:ext uri="{FF2B5EF4-FFF2-40B4-BE49-F238E27FC236}">
-                <a16:creationId xmlns:a16="http://schemas.microsoft.com/office/drawing/2014/main" id="{BB0822C5-45F8-48C5-867F-0DE853868476}"/>
+          <p:cNvPr id="86" name="Straight Connector 85">
+            <a:extLst>
+              <a:ext uri="{FF2B5EF4-FFF2-40B4-BE49-F238E27FC236}">
+                <a16:creationId xmlns:a16="http://schemas.microsoft.com/office/drawing/2014/main" id="{8B45C962-0D68-4A01-9627-70DEBBC363C7}"/>
               </a:ext>
               <a:ext uri="{C183D7F6-B498-43B3-948B-1728B52AA6E4}">
                 <adec:decorative xmlns:adec="http://schemas.microsoft.com/office/drawing/2017/decorative" val="1"/>
@@ -9977,9 +9976,9 @@
           </p:nvPr>
         </p:nvCxnSpPr>
         <p:spPr>
-          <a:xfrm>
-            <a:off x="6629400" y="573488"/>
-            <a:ext cx="0" cy="5717041"/>
+          <a:xfrm flipH="1">
+            <a:off x="577175" y="571500"/>
+            <a:ext cx="11054799" cy="0"/>
           </a:xfrm>
           <a:prstGeom prst="line">
             <a:avLst/>
@@ -10007,10 +10006,10 @@
       </p:cxnSp>
       <p:cxnSp>
         <p:nvCxnSpPr>
-          <p:cNvPr id="54" name="Straight Connector 53">
-            <a:extLst>
-              <a:ext uri="{FF2B5EF4-FFF2-40B4-BE49-F238E27FC236}">
-                <a16:creationId xmlns:a16="http://schemas.microsoft.com/office/drawing/2014/main" id="{A91E38C7-3164-416B-A453-D3B6F612D325}"/>
+          <p:cNvPr id="88" name="Straight Connector 87">
+            <a:extLst>
+              <a:ext uri="{FF2B5EF4-FFF2-40B4-BE49-F238E27FC236}">
+                <a16:creationId xmlns:a16="http://schemas.microsoft.com/office/drawing/2014/main" id="{F1D89FBF-493B-4E7D-B511-7E40674F6323}"/>
               </a:ext>
               <a:ext uri="{C183D7F6-B498-43B3-948B-1728B52AA6E4}">
                 <adec:decorative xmlns:adec="http://schemas.microsoft.com/office/drawing/2017/decorative" val="1"/>
@@ -10029,9 +10028,9 @@
           </p:nvPr>
         </p:nvCxnSpPr>
         <p:spPr>
-          <a:xfrm flipH="1">
-            <a:off x="577175" y="571500"/>
-            <a:ext cx="11054799" cy="0"/>
+          <a:xfrm>
+            <a:off x="5524500" y="573971"/>
+            <a:ext cx="0" cy="5712529"/>
           </a:xfrm>
           <a:prstGeom prst="line">
             <a:avLst/>
@@ -10059,10 +10058,10 @@
       </p:cxnSp>
       <p:pic>
         <p:nvPicPr>
-          <p:cNvPr id="7" name="Content Placeholder 6" descr="A screen shot of a computer program&#10;&#10;AI-generated content may be incorrect.">
-            <a:extLst>
-              <a:ext uri="{FF2B5EF4-FFF2-40B4-BE49-F238E27FC236}">
-                <a16:creationId xmlns:a16="http://schemas.microsoft.com/office/drawing/2014/main" id="{79BBD27C-DA30-437F-4164-D420E63C15AC}"/>
+          <p:cNvPr id="6" name="Content Placeholder 5" descr="A screenshot of a computer program&#10;&#10;AI-generated content may be incorrect.">
+            <a:extLst>
+              <a:ext uri="{FF2B5EF4-FFF2-40B4-BE49-F238E27FC236}">
+                <a16:creationId xmlns:a16="http://schemas.microsoft.com/office/drawing/2014/main" id="{57DB124F-9B83-0269-EDFD-E583F046CCDC}"/>
               </a:ext>
             </a:extLst>
           </p:cNvPr>
@@ -10075,13 +10074,14 @@
         </p:nvPicPr>
         <p:blipFill>
           <a:blip r:embed="rId2"/>
-          <a:srcRect r="8254" b="-3"/>
-          <a:stretch/>
+          <a:stretch>
+            <a:fillRect/>
+          </a:stretch>
         </p:blipFill>
         <p:spPr>
           <a:xfrm>
-            <a:off x="6905284" y="1671095"/>
-            <a:ext cx="4714892" cy="3507521"/>
+            <a:off x="5846679" y="853692"/>
+            <a:ext cx="5727522" cy="4367235"/>
           </a:xfrm>
           <a:prstGeom prst="rect">
             <a:avLst/>
@@ -10090,10 +10090,10 @@
       </p:pic>
       <p:cxnSp>
         <p:nvCxnSpPr>
-          <p:cNvPr id="56" name="Straight Connector 55">
-            <a:extLst>
-              <a:ext uri="{FF2B5EF4-FFF2-40B4-BE49-F238E27FC236}">
-                <a16:creationId xmlns:a16="http://schemas.microsoft.com/office/drawing/2014/main" id="{EC3B131B-2BD8-4155-8C64-85668842E2EA}"/>
+          <p:cNvPr id="90" name="Straight Connector 89">
+            <a:extLst>
+              <a:ext uri="{FF2B5EF4-FFF2-40B4-BE49-F238E27FC236}">
+                <a16:creationId xmlns:a16="http://schemas.microsoft.com/office/drawing/2014/main" id="{4BCC744E-5590-4542-B37F-B764470BF05E}"/>
               </a:ext>
               <a:ext uri="{C183D7F6-B498-43B3-948B-1728B52AA6E4}">
                 <adec:decorative xmlns:adec="http://schemas.microsoft.com/office/drawing/2017/decorative" val="1"/>
@@ -10113,8 +10113,8 @@
         </p:nvCxnSpPr>
         <p:spPr>
           <a:xfrm flipH="1">
-            <a:off x="584291" y="6287701"/>
-            <a:ext cx="11023419" cy="0"/>
+            <a:off x="577176" y="6286500"/>
+            <a:ext cx="11043324" cy="0"/>
           </a:xfrm>
           <a:prstGeom prst="line">
             <a:avLst/>

</xml_diff>

<commit_message>
Update execution counts for consistency and remove 'offerType' feature from model training in index.ipynb
</commit_message>
<xml_diff>
--- a/Cars price.pptx
+++ b/Cars price.pptx
@@ -9165,168 +9165,12 @@
           <a:chExt cx="0" cy="0"/>
         </a:xfrm>
       </p:grpSpPr>
-      <p:cxnSp>
-        <p:nvCxnSpPr>
-          <p:cNvPr id="29" name="Straight Connector 28">
-            <a:extLst>
-              <a:ext uri="{FF2B5EF4-FFF2-40B4-BE49-F238E27FC236}">
-                <a16:creationId xmlns:a16="http://schemas.microsoft.com/office/drawing/2014/main" id="{A240FCEE-B6E2-46D0-9BB0-F45F79545E9D}"/>
-              </a:ext>
-              <a:ext uri="{C183D7F6-B498-43B3-948B-1728B52AA6E4}">
-                <adec:decorative xmlns:adec="http://schemas.microsoft.com/office/drawing/2017/decorative" val="1"/>
-              </a:ext>
-            </a:extLst>
-          </p:cNvPr>
-          <p:cNvCxnSpPr>
-            <a:cxnSpLocks noGrp="1" noRot="1" noChangeAspect="1" noMove="1" noResize="1" noEditPoints="1" noAdjustHandles="1" noChangeArrowheads="1" noChangeShapeType="1"/>
-          </p:cNvCxnSpPr>
-          <p:nvPr>
-            <p:extLst>
-              <p:ext uri="{386F3935-93C4-4BCD-93E2-E3B085C9AB24}">
-                <p16:designElem xmlns:p16="http://schemas.microsoft.com/office/powerpoint/2015/main" val="1"/>
-              </p:ext>
-            </p:extLst>
-          </p:nvPr>
-        </p:nvCxnSpPr>
-        <p:spPr>
-          <a:xfrm flipH="1">
-            <a:off x="571501" y="571500"/>
-            <a:ext cx="11059811" cy="0"/>
-          </a:xfrm>
-          <a:prstGeom prst="line">
-            <a:avLst/>
-          </a:prstGeom>
-          <a:ln>
-            <a:solidFill>
-              <a:schemeClr val="tx1"/>
-            </a:solidFill>
-          </a:ln>
-        </p:spPr>
-        <p:style>
-          <a:lnRef idx="1">
-            <a:schemeClr val="accent1"/>
-          </a:lnRef>
-          <a:fillRef idx="0">
-            <a:schemeClr val="accent1"/>
-          </a:fillRef>
-          <a:effectRef idx="0">
-            <a:schemeClr val="accent1"/>
-          </a:effectRef>
-          <a:fontRef idx="minor">
-            <a:schemeClr val="tx1"/>
-          </a:fontRef>
-        </p:style>
-      </p:cxnSp>
-      <p:cxnSp>
-        <p:nvCxnSpPr>
-          <p:cNvPr id="31" name="Straight Connector 30">
-            <a:extLst>
-              <a:ext uri="{FF2B5EF4-FFF2-40B4-BE49-F238E27FC236}">
-                <a16:creationId xmlns:a16="http://schemas.microsoft.com/office/drawing/2014/main" id="{3BD2FB83-3783-4477-80B5-DA5BF10BAF57}"/>
-              </a:ext>
-              <a:ext uri="{C183D7F6-B498-43B3-948B-1728B52AA6E4}">
-                <adec:decorative xmlns:adec="http://schemas.microsoft.com/office/drawing/2017/decorative" val="1"/>
-              </a:ext>
-            </a:extLst>
-          </p:cNvPr>
-          <p:cNvCxnSpPr>
-            <a:cxnSpLocks noGrp="1" noRot="1" noChangeAspect="1" noMove="1" noResize="1" noEditPoints="1" noAdjustHandles="1" noChangeArrowheads="1" noChangeShapeType="1"/>
-          </p:cNvCxnSpPr>
-          <p:nvPr>
-            <p:extLst>
-              <p:ext uri="{386F3935-93C4-4BCD-93E2-E3B085C9AB24}">
-                <p16:designElem xmlns:p16="http://schemas.microsoft.com/office/powerpoint/2015/main" val="1"/>
-              </p:ext>
-            </p:extLst>
-          </p:nvPr>
-        </p:nvCxnSpPr>
-        <p:spPr>
-          <a:xfrm>
-            <a:off x="7742482" y="571500"/>
-            <a:ext cx="0" cy="5715000"/>
-          </a:xfrm>
-          <a:prstGeom prst="line">
-            <a:avLst/>
-          </a:prstGeom>
-          <a:ln>
-            <a:solidFill>
-              <a:schemeClr val="tx1"/>
-            </a:solidFill>
-          </a:ln>
-        </p:spPr>
-        <p:style>
-          <a:lnRef idx="1">
-            <a:schemeClr val="accent1"/>
-          </a:lnRef>
-          <a:fillRef idx="0">
-            <a:schemeClr val="accent1"/>
-          </a:fillRef>
-          <a:effectRef idx="0">
-            <a:schemeClr val="accent1"/>
-          </a:effectRef>
-          <a:fontRef idx="minor">
-            <a:schemeClr val="tx1"/>
-          </a:fontRef>
-        </p:style>
-      </p:cxnSp>
-      <p:cxnSp>
-        <p:nvCxnSpPr>
-          <p:cNvPr id="33" name="Straight Connector 32">
-            <a:extLst>
-              <a:ext uri="{FF2B5EF4-FFF2-40B4-BE49-F238E27FC236}">
-                <a16:creationId xmlns:a16="http://schemas.microsoft.com/office/drawing/2014/main" id="{E83EA203-71D5-49C0-9626-FFA8E46787B0}"/>
-              </a:ext>
-              <a:ext uri="{C183D7F6-B498-43B3-948B-1728B52AA6E4}">
-                <adec:decorative xmlns:adec="http://schemas.microsoft.com/office/drawing/2017/decorative" val="1"/>
-              </a:ext>
-            </a:extLst>
-          </p:cNvPr>
-          <p:cNvCxnSpPr>
-            <a:cxnSpLocks noGrp="1" noRot="1" noChangeAspect="1" noMove="1" noResize="1" noEditPoints="1" noAdjustHandles="1" noChangeArrowheads="1" noChangeShapeType="1"/>
-          </p:cNvCxnSpPr>
-          <p:nvPr>
-            <p:extLst>
-              <p:ext uri="{386F3935-93C4-4BCD-93E2-E3B085C9AB24}">
-                <p16:designElem xmlns:p16="http://schemas.microsoft.com/office/powerpoint/2015/main" val="1"/>
-              </p:ext>
-            </p:extLst>
-          </p:nvPr>
-        </p:nvCxnSpPr>
-        <p:spPr>
-          <a:xfrm flipH="1">
-            <a:off x="577485" y="6283518"/>
-            <a:ext cx="11059811" cy="0"/>
-          </a:xfrm>
-          <a:prstGeom prst="line">
-            <a:avLst/>
-          </a:prstGeom>
-          <a:ln>
-            <a:solidFill>
-              <a:schemeClr val="tx1"/>
-            </a:solidFill>
-          </a:ln>
-        </p:spPr>
-        <p:style>
-          <a:lnRef idx="1">
-            <a:schemeClr val="accent1"/>
-          </a:lnRef>
-          <a:fillRef idx="0">
-            <a:schemeClr val="accent1"/>
-          </a:fillRef>
-          <a:effectRef idx="0">
-            <a:schemeClr val="accent1"/>
-          </a:effectRef>
-          <a:fontRef idx="minor">
-            <a:schemeClr val="tx1"/>
-          </a:fontRef>
-        </p:style>
-      </p:cxnSp>
       <p:sp useBgFill="1">
         <p:nvSpPr>
-          <p:cNvPr id="35" name="Rectangle 34">
-            <a:extLst>
-              <a:ext uri="{FF2B5EF4-FFF2-40B4-BE49-F238E27FC236}">
-                <a16:creationId xmlns:a16="http://schemas.microsoft.com/office/drawing/2014/main" id="{D26BC87E-DCC8-4E66-972D-A587756DF30A}"/>
+          <p:cNvPr id="46" name="Rectangle 45">
+            <a:extLst>
+              <a:ext uri="{FF2B5EF4-FFF2-40B4-BE49-F238E27FC236}">
+                <a16:creationId xmlns:a16="http://schemas.microsoft.com/office/drawing/2014/main" id="{5D28D120-1389-4B3F-BECB-0949DCCAC752}"/>
               </a:ext>
               <a:ext uri="{C183D7F6-B498-43B3-948B-1728B52AA6E4}">
                 <adec:decorative xmlns:adec="http://schemas.microsoft.com/office/drawing/2017/decorative" val="1"/>
@@ -9399,8 +9243,8 @@
         </p:nvSpPr>
         <p:spPr>
           <a:xfrm>
-            <a:off x="521208" y="822960"/>
-            <a:ext cx="3898392" cy="5049781"/>
+            <a:off x="518551" y="784857"/>
+            <a:ext cx="3562038" cy="5151580"/>
           </a:xfrm>
         </p:spPr>
         <p:txBody>
@@ -9410,29 +9254,29 @@
           <a:lstStyle/>
           <a:p>
             <a:r>
-              <a:rPr lang="en-US" sz="2300" b="1"/>
+              <a:rPr lang="en-US" sz="2200" b="1"/>
               <a:t>Data Preprocessing: Encoding Categorical Variables</a:t>
             </a:r>
             <a:br>
-              <a:rPr lang="en-US" sz="2300"/>
+              <a:rPr lang="en-US" sz="2200"/>
             </a:br>
             <a:r>
-              <a:rPr lang="en-US" sz="2300"/>
+              <a:rPr lang="en-US" sz="2200"/>
               <a:t>This slide shows the conversion of categorical columns "model" and "offerType" into numerical codes using astype('category').cat.codes, enabling these features to be used in the RandomForestRegressor model for price prediction.</a:t>
             </a:r>
             <a:br>
-              <a:rPr lang="en-US" sz="2300"/>
+              <a:rPr lang="en-US" sz="2200"/>
             </a:br>
-            <a:endParaRPr lang="en-US" sz="2300"/>
+            <a:endParaRPr lang="en-US" sz="2200"/>
           </a:p>
         </p:txBody>
       </p:sp>
       <p:cxnSp>
         <p:nvCxnSpPr>
-          <p:cNvPr id="37" name="Straight Connector 36">
-            <a:extLst>
-              <a:ext uri="{FF2B5EF4-FFF2-40B4-BE49-F238E27FC236}">
-                <a16:creationId xmlns:a16="http://schemas.microsoft.com/office/drawing/2014/main" id="{8B45C962-0D68-4A01-9627-70DEBBC363C7}"/>
+          <p:cNvPr id="48" name="Straight Connector 47">
+            <a:extLst>
+              <a:ext uri="{FF2B5EF4-FFF2-40B4-BE49-F238E27FC236}">
+                <a16:creationId xmlns:a16="http://schemas.microsoft.com/office/drawing/2014/main" id="{D927055D-9ECF-487E-91DD-FFA84AB92DB8}"/>
               </a:ext>
               <a:ext uri="{C183D7F6-B498-43B3-948B-1728B52AA6E4}">
                 <adec:decorative xmlns:adec="http://schemas.microsoft.com/office/drawing/2017/decorative" val="1"/>
@@ -9452,7 +9296,7 @@
         </p:nvCxnSpPr>
         <p:spPr>
           <a:xfrm flipH="1">
-            <a:off x="577175" y="571500"/>
+            <a:off x="571333" y="571500"/>
             <a:ext cx="11054799" cy="0"/>
           </a:xfrm>
           <a:prstGeom prst="line">
@@ -9479,12 +9323,74 @@
           </a:fontRef>
         </p:style>
       </p:cxnSp>
+      <p:pic>
+        <p:nvPicPr>
+          <p:cNvPr id="6" name="Picture 5">
+            <a:extLst>
+              <a:ext uri="{FF2B5EF4-FFF2-40B4-BE49-F238E27FC236}">
+                <a16:creationId xmlns:a16="http://schemas.microsoft.com/office/drawing/2014/main" id="{0A3A924E-C75A-E0F9-19BE-8CAB4893ADE9}"/>
+              </a:ext>
+            </a:extLst>
+          </p:cNvPr>
+          <p:cNvPicPr>
+            <a:picLocks noChangeAspect="1"/>
+          </p:cNvPicPr>
+          <p:nvPr/>
+        </p:nvPicPr>
+        <p:blipFill>
+          <a:blip r:embed="rId2"/>
+          <a:stretch>
+            <a:fillRect/>
+          </a:stretch>
+        </p:blipFill>
+        <p:spPr>
+          <a:xfrm>
+            <a:off x="4758612" y="1995131"/>
+            <a:ext cx="6867517" cy="806932"/>
+          </a:xfrm>
+          <a:prstGeom prst="rect">
+            <a:avLst/>
+          </a:prstGeom>
+        </p:spPr>
+      </p:pic>
+      <p:sp>
+        <p:nvSpPr>
+          <p:cNvPr id="4" name="Content Placeholder 3">
+            <a:extLst>
+              <a:ext uri="{FF2B5EF4-FFF2-40B4-BE49-F238E27FC236}">
+                <a16:creationId xmlns:a16="http://schemas.microsoft.com/office/drawing/2014/main" id="{AB4113A3-DF0D-22C5-23B2-D207FDF04061}"/>
+              </a:ext>
+            </a:extLst>
+          </p:cNvPr>
+          <p:cNvSpPr>
+            <a:spLocks noGrp="1"/>
+          </p:cNvSpPr>
+          <p:nvPr>
+            <p:ph idx="1"/>
+          </p:nvPr>
+        </p:nvSpPr>
+        <p:spPr>
+          <a:xfrm>
+            <a:off x="4698255" y="4225693"/>
+            <a:ext cx="6933055" cy="1775059"/>
+          </a:xfrm>
+        </p:spPr>
+        <p:txBody>
+          <a:bodyPr anchor="t">
+            <a:normAutofit/>
+          </a:bodyPr>
+          <a:lstStyle/>
+          <a:p>
+            <a:endParaRPr lang="en-US" sz="1800"/>
+          </a:p>
+        </p:txBody>
+      </p:sp>
       <p:cxnSp>
         <p:nvCxnSpPr>
-          <p:cNvPr id="39" name="Straight Connector 38">
-            <a:extLst>
-              <a:ext uri="{FF2B5EF4-FFF2-40B4-BE49-F238E27FC236}">
-                <a16:creationId xmlns:a16="http://schemas.microsoft.com/office/drawing/2014/main" id="{F1D89FBF-493B-4E7D-B511-7E40674F6323}"/>
+          <p:cNvPr id="50" name="Straight Connector 49">
+            <a:extLst>
+              <a:ext uri="{FF2B5EF4-FFF2-40B4-BE49-F238E27FC236}">
+                <a16:creationId xmlns:a16="http://schemas.microsoft.com/office/drawing/2014/main" id="{F0DC1883-8AF7-483D-9074-3C6D8AF57596}"/>
               </a:ext>
               <a:ext uri="{C183D7F6-B498-43B3-948B-1728B52AA6E4}">
                 <adec:decorative xmlns:adec="http://schemas.microsoft.com/office/drawing/2017/decorative" val="1"/>
@@ -9503,9 +9409,9 @@
           </p:nvPr>
         </p:nvCxnSpPr>
         <p:spPr>
-          <a:xfrm>
-            <a:off x="5524500" y="573971"/>
-            <a:ext cx="0" cy="5712529"/>
+          <a:xfrm flipH="1">
+            <a:off x="571500" y="6286500"/>
+            <a:ext cx="11054799" cy="0"/>
           </a:xfrm>
           <a:prstGeom prst="line">
             <a:avLst/>
@@ -9531,50 +9437,12 @@
           </a:fontRef>
         </p:style>
       </p:cxnSp>
-      <p:pic>
-        <p:nvPicPr>
-          <p:cNvPr id="7" name="Content Placeholder 6" descr="A computer screen shot of a computer code&#10;&#10;AI-generated content may be incorrect.">
-            <a:extLst>
-              <a:ext uri="{FF2B5EF4-FFF2-40B4-BE49-F238E27FC236}">
-                <a16:creationId xmlns:a16="http://schemas.microsoft.com/office/drawing/2014/main" id="{DA080EBA-2075-797D-7BFD-52804642C517}"/>
-              </a:ext>
-            </a:extLst>
-          </p:cNvPr>
-          <p:cNvPicPr>
-            <a:picLocks noGrp="1" noChangeAspect="1"/>
-          </p:cNvPicPr>
-          <p:nvPr>
-            <p:ph idx="1"/>
-          </p:nvPr>
-        </p:nvPicPr>
-        <p:blipFill>
-          <a:blip r:embed="rId2">
-            <a:extLst>
-              <a:ext uri="{28A0092B-C50C-407E-A947-70E740481C1C}">
-                <a14:useLocalDpi xmlns:a14="http://schemas.microsoft.com/office/drawing/2010/main" val="0"/>
-              </a:ext>
-            </a:extLst>
-          </a:blip>
-          <a:stretch>
-            <a:fillRect/>
-          </a:stretch>
-        </p:blipFill>
-        <p:spPr>
-          <a:xfrm>
-            <a:off x="5800384" y="2615351"/>
-            <a:ext cx="5820112" cy="843916"/>
-          </a:xfrm>
-          <a:prstGeom prst="rect">
-            <a:avLst/>
-          </a:prstGeom>
-        </p:spPr>
-      </p:pic>
       <p:cxnSp>
         <p:nvCxnSpPr>
-          <p:cNvPr id="41" name="Straight Connector 40">
-            <a:extLst>
-              <a:ext uri="{FF2B5EF4-FFF2-40B4-BE49-F238E27FC236}">
-                <a16:creationId xmlns:a16="http://schemas.microsoft.com/office/drawing/2014/main" id="{4BCC744E-5590-4542-B37F-B764470BF05E}"/>
+          <p:cNvPr id="52" name="Straight Connector 51">
+            <a:extLst>
+              <a:ext uri="{FF2B5EF4-FFF2-40B4-BE49-F238E27FC236}">
+                <a16:creationId xmlns:a16="http://schemas.microsoft.com/office/drawing/2014/main" id="{1CF89D75-E5AC-4C45-9D87-228849A4C7A5}"/>
               </a:ext>
               <a:ext uri="{C183D7F6-B498-43B3-948B-1728B52AA6E4}">
                 <adec:decorative xmlns:adec="http://schemas.microsoft.com/office/drawing/2017/decorative" val="1"/>
@@ -9593,9 +9461,9 @@
           </p:nvPr>
         </p:nvCxnSpPr>
         <p:spPr>
-          <a:xfrm flipH="1">
-            <a:off x="577176" y="6286500"/>
-            <a:ext cx="11043324" cy="0"/>
+          <a:xfrm>
+            <a:off x="4419600" y="571500"/>
+            <a:ext cx="0" cy="5715000"/>
           </a:xfrm>
           <a:prstGeom prst="line">
             <a:avLst/>

</xml_diff>